<commit_message>
Proxy and spelling fix
</commit_message>
<xml_diff>
--- a/Notes/Powerpoints/Proxy.pptx
+++ b/Notes/Powerpoints/Proxy.pptx
@@ -5,11 +5,12 @@
     <p:sldMasterId id="2147483648" r:id="rId1"/>
   </p:sldMasterIdLst>
   <p:sldIdLst>
-    <p:sldId id="256" r:id="rId2"/>
-    <p:sldId id="258" r:id="rId3"/>
-    <p:sldId id="266" r:id="rId4"/>
-    <p:sldId id="267" r:id="rId5"/>
-    <p:sldId id="265" r:id="rId6"/>
+    <p:sldId id="268" r:id="rId2"/>
+    <p:sldId id="256" r:id="rId3"/>
+    <p:sldId id="258" r:id="rId4"/>
+    <p:sldId id="266" r:id="rId5"/>
+    <p:sldId id="267" r:id="rId6"/>
+    <p:sldId id="265" r:id="rId7"/>
   </p:sldIdLst>
   <p:sldSz cx="12192000" cy="6858000"/>
   <p:notesSz cx="6858000" cy="9144000"/>
@@ -6169,7 +6170,7 @@
           <p:cNvPr id="2" name="Title 1">
             <a:extLst>
               <a:ext uri="{FF2B5EF4-FFF2-40B4-BE49-F238E27FC236}">
-                <a16:creationId xmlns:a16="http://schemas.microsoft.com/office/drawing/2014/main" id="{1F0E3005-E7D0-471D-8EBA-5DADA2960E16}"/>
+                <a16:creationId xmlns:a16="http://schemas.microsoft.com/office/drawing/2014/main" id="{B709BE85-E9BC-46F7-BBEE-EBF3A5E4DD82}"/>
               </a:ext>
             </a:extLst>
           </p:cNvPr>
@@ -6177,48 +6178,31 @@
             <a:spLocks noGrp="1"/>
           </p:cNvSpPr>
           <p:nvPr>
-            <p:ph type="ctrTitle"/>
-          </p:nvPr>
-        </p:nvSpPr>
-        <p:spPr/>
-        <p:txBody>
-          <a:bodyPr/>
+            <p:ph type="title"/>
+          </p:nvPr>
+        </p:nvSpPr>
+        <p:spPr>
+          <a:xfrm>
+            <a:off x="651209" y="2368731"/>
+            <a:ext cx="8596668" cy="1320800"/>
+          </a:xfrm>
+        </p:spPr>
+        <p:txBody>
+          <a:bodyPr>
+            <a:normAutofit fontScale="90000"/>
+          </a:bodyPr>
           <a:lstStyle/>
           <a:p>
             <a:r>
               <a:rPr lang="en-US" dirty="0"/>
-              <a:t>Design Patterns</a:t>
-            </a:r>
-          </a:p>
-        </p:txBody>
-      </p:sp>
-      <p:sp>
-        <p:nvSpPr>
-          <p:cNvPr id="3" name="Subtitle 2">
-            <a:extLst>
-              <a:ext uri="{FF2B5EF4-FFF2-40B4-BE49-F238E27FC236}">
-                <a16:creationId xmlns:a16="http://schemas.microsoft.com/office/drawing/2014/main" id="{EB069580-9515-4CA1-99E8-D9604888B24F}"/>
-              </a:ext>
-            </a:extLst>
-          </p:cNvPr>
-          <p:cNvSpPr>
-            <a:spLocks noGrp="1"/>
-          </p:cNvSpPr>
-          <p:nvPr>
-            <p:ph type="subTitle" idx="1"/>
-          </p:nvPr>
-        </p:nvSpPr>
-        <p:spPr/>
-        <p:txBody>
-          <a:bodyPr/>
-          <a:lstStyle/>
-          <a:p>
-            <a:r>
+              <a:t>When you were a kid, what did you want to be when you grew up?</a:t>
+            </a:r>
+            <a:br>
               <a:rPr lang="en-US" dirty="0"/>
-              <a:t>Proxy</a:t>
-            </a:r>
-          </a:p>
-          <a:p>
+            </a:br>
+            <a:br>
+              <a:rPr lang="en-US" dirty="0"/>
+            </a:br>
             <a:endParaRPr lang="en-US" dirty="0"/>
           </a:p>
         </p:txBody>
@@ -6226,7 +6210,7 @@
     </p:spTree>
     <p:extLst>
       <p:ext uri="{BB962C8B-B14F-4D97-AF65-F5344CB8AC3E}">
-        <p14:creationId xmlns:p14="http://schemas.microsoft.com/office/powerpoint/2010/main" val="3276895302"/>
+        <p14:creationId xmlns:p14="http://schemas.microsoft.com/office/powerpoint/2010/main" val="3045226722"/>
       </p:ext>
     </p:extLst>
   </p:cSld>
@@ -6258,7 +6242,7 @@
           <p:cNvPr id="2" name="Title 1">
             <a:extLst>
               <a:ext uri="{FF2B5EF4-FFF2-40B4-BE49-F238E27FC236}">
-                <a16:creationId xmlns:a16="http://schemas.microsoft.com/office/drawing/2014/main" id="{2ECBD130-1D48-4AF3-A3A8-C5133E2A75A3}"/>
+                <a16:creationId xmlns:a16="http://schemas.microsoft.com/office/drawing/2014/main" id="{1F0E3005-E7D0-471D-8EBA-5DADA2960E16}"/>
               </a:ext>
             </a:extLst>
           </p:cNvPr>
@@ -6266,7 +6250,7 @@
             <a:spLocks noGrp="1"/>
           </p:cNvSpPr>
           <p:nvPr>
-            <p:ph type="title"/>
+            <p:ph type="ctrTitle"/>
           </p:nvPr>
         </p:nvSpPr>
         <p:spPr/>
@@ -6276,17 +6260,17 @@
           <a:p>
             <a:r>
               <a:rPr lang="en-US" dirty="0"/>
-              <a:t>Parts of the Pattern	</a:t>
-            </a:r>
-          </a:p>
-        </p:txBody>
-      </p:sp>
-      <p:sp>
-        <p:nvSpPr>
-          <p:cNvPr id="3" name="Content Placeholder 2">
+              <a:t>Design Patterns</a:t>
+            </a:r>
+          </a:p>
+        </p:txBody>
+      </p:sp>
+      <p:sp>
+        <p:nvSpPr>
+          <p:cNvPr id="3" name="Subtitle 2">
             <a:extLst>
               <a:ext uri="{FF2B5EF4-FFF2-40B4-BE49-F238E27FC236}">
-                <a16:creationId xmlns:a16="http://schemas.microsoft.com/office/drawing/2014/main" id="{90753FE7-C125-47BF-A574-43D69C7586C9}"/>
+                <a16:creationId xmlns:a16="http://schemas.microsoft.com/office/drawing/2014/main" id="{EB069580-9515-4CA1-99E8-D9604888B24F}"/>
               </a:ext>
             </a:extLst>
           </p:cNvPr>
@@ -6294,68 +6278,17 @@
             <a:spLocks noGrp="1"/>
           </p:cNvSpPr>
           <p:nvPr>
-            <p:ph idx="1"/>
+            <p:ph type="subTitle" idx="1"/>
           </p:nvPr>
         </p:nvSpPr>
         <p:spPr/>
         <p:txBody>
-          <a:bodyPr>
-            <a:normAutofit fontScale="92500" lnSpcReduction="10000"/>
-          </a:bodyPr>
+          <a:bodyPr/>
           <a:lstStyle/>
           <a:p>
             <a:r>
               <a:rPr lang="en-US" dirty="0"/>
-              <a:t>The Proxy has a reference to the real subject, it also has an interface identical to Subject’s so that the two can be used interchangeably. It controls access to the Real Subject and may be responsible for creating and destroying it</a:t>
-            </a:r>
-          </a:p>
-          <a:p>
-            <a:pPr marL="457200" lvl="1" indent="0">
-              <a:buNone/>
-            </a:pPr>
-            <a:r>
-              <a:rPr lang="en-US" dirty="0"/>
-              <a:t>Different Types</a:t>
-            </a:r>
-          </a:p>
-          <a:p>
-            <a:pPr lvl="1"/>
-            <a:r>
-              <a:rPr lang="en-US" dirty="0"/>
-              <a:t>Remote – Responsible for representing the object located remotely. Talking to the real object may involve sending something across a network</a:t>
-            </a:r>
-          </a:p>
-          <a:p>
-            <a:pPr lvl="1"/>
-            <a:r>
-              <a:rPr lang="en-US" dirty="0"/>
-              <a:t>Virtual – Responsible for the creation of an object which is slow to create (Image in book)</a:t>
-            </a:r>
-          </a:p>
-          <a:p>
-            <a:pPr lvl="1"/>
-            <a:r>
-              <a:rPr lang="en-US" dirty="0"/>
-              <a:t>Protection – Check that the caller has access permissions required to perform the request</a:t>
-            </a:r>
-          </a:p>
-          <a:p>
-            <a:pPr lvl="1"/>
-            <a:r>
-              <a:rPr lang="en-US" dirty="0"/>
-              <a:t>Smart – Adds to or change the request before sending them (NHibernate)</a:t>
-            </a:r>
-          </a:p>
-          <a:p>
-            <a:r>
-              <a:rPr lang="en-US" dirty="0"/>
-              <a:t>The Subject defines the common interface for Real Subject and Proxy so Proxy can be used anywhere Real Subject is expected</a:t>
-            </a:r>
-          </a:p>
-          <a:p>
-            <a:r>
-              <a:rPr lang="en-US" dirty="0"/>
-              <a:t>The Real Subject defines the ‘real’ object that the proxy represents</a:t>
+              <a:t>Proxy</a:t>
             </a:r>
           </a:p>
           <a:p>
@@ -6366,7 +6299,7 @@
     </p:spTree>
     <p:extLst>
       <p:ext uri="{BB962C8B-B14F-4D97-AF65-F5344CB8AC3E}">
-        <p14:creationId xmlns:p14="http://schemas.microsoft.com/office/powerpoint/2010/main" val="2107916926"/>
+        <p14:creationId xmlns:p14="http://schemas.microsoft.com/office/powerpoint/2010/main" val="3276895302"/>
       </p:ext>
     </p:extLst>
   </p:cSld>
@@ -6398,7 +6331,7 @@
           <p:cNvPr id="2" name="Title 1">
             <a:extLst>
               <a:ext uri="{FF2B5EF4-FFF2-40B4-BE49-F238E27FC236}">
-                <a16:creationId xmlns:a16="http://schemas.microsoft.com/office/drawing/2014/main" id="{14A5DE64-64B7-4121-8DBF-9988BAD28A4B}"/>
+                <a16:creationId xmlns:a16="http://schemas.microsoft.com/office/drawing/2014/main" id="{2ECBD130-1D48-4AF3-A3A8-C5133E2A75A3}"/>
               </a:ext>
             </a:extLst>
           </p:cNvPr>
@@ -6415,12 +6348,8 @@
           <a:lstStyle/>
           <a:p>
             <a:r>
-              <a:rPr lang="en-US" dirty="0" err="1"/>
-              <a:t>Nhibernate</a:t>
-            </a:r>
-            <a:r>
               <a:rPr lang="en-US" dirty="0"/>
-              <a:t>	</a:t>
+              <a:t>Parts of the Pattern	</a:t>
             </a:r>
           </a:p>
         </p:txBody>
@@ -6430,7 +6359,7 @@
           <p:cNvPr id="3" name="Content Placeholder 2">
             <a:extLst>
               <a:ext uri="{FF2B5EF4-FFF2-40B4-BE49-F238E27FC236}">
-                <a16:creationId xmlns:a16="http://schemas.microsoft.com/office/drawing/2014/main" id="{67A21B1F-1FBF-4FA4-8E5B-3AEF56DDAEA3}"/>
+                <a16:creationId xmlns:a16="http://schemas.microsoft.com/office/drawing/2014/main" id="{90753FE7-C125-47BF-A574-43D69C7586C9}"/>
               </a:ext>
             </a:extLst>
           </p:cNvPr>
@@ -6443,86 +6372,66 @@
         </p:nvSpPr>
         <p:spPr/>
         <p:txBody>
-          <a:bodyPr/>
-          <a:lstStyle/>
-          <a:p>
-            <a:r>
-              <a:rPr lang="en-US" dirty="0" err="1"/>
-              <a:t>Nhibernate</a:t>
-            </a:r>
+          <a:bodyPr>
+            <a:normAutofit fontScale="92500" lnSpcReduction="10000"/>
+          </a:bodyPr>
+          <a:lstStyle/>
+          <a:p>
             <a:r>
               <a:rPr lang="en-US" dirty="0"/>
-              <a:t> is the biggest example of where we run into proxies. You may not see it, but under the hood, </a:t>
-            </a:r>
-            <a:r>
-              <a:rPr lang="en-US" dirty="0" err="1"/>
-              <a:t>nhibernate</a:t>
-            </a:r>
+              <a:t>The Proxy has a reference to the real subject, it also has an interface identical to Subject’s so that the two can be used interchangeably. It controls access to the Real Subject and may be responsible for creating and destroying it</a:t>
+            </a:r>
+          </a:p>
+          <a:p>
+            <a:pPr marL="457200" lvl="1" indent="0">
+              <a:buNone/>
+            </a:pPr>
             <a:r>
               <a:rPr lang="en-US" dirty="0"/>
-              <a:t> is substituting proxies for our Business Models, which is why they have to have ‘virtual’ keywords</a:t>
-            </a:r>
-          </a:p>
-          <a:p>
+              <a:t>Different Types</a:t>
+            </a:r>
+          </a:p>
+          <a:p>
+            <a:pPr lvl="1"/>
             <a:r>
               <a:rPr lang="en-US" dirty="0"/>
-              <a:t>When </a:t>
-            </a:r>
-            <a:r>
-              <a:rPr lang="en-US" dirty="0" err="1"/>
-              <a:t>Nhibernate</a:t>
-            </a:r>
+              <a:t>Remote – Responsible for representing the object located remotely. Talking to the real object may involve sending something across a network</a:t>
+            </a:r>
+          </a:p>
+          <a:p>
+            <a:pPr lvl="1"/>
             <a:r>
               <a:rPr lang="en-US" dirty="0"/>
-              <a:t> first grabs an entity with lazy loaded parents (think license and it’s license code) it doesn’t immediately fetch the license code. </a:t>
-            </a:r>
-          </a:p>
-          <a:p>
+              <a:t>Virtual – Responsible for the creation of an object which is slow to create (Image in book)</a:t>
+            </a:r>
+          </a:p>
+          <a:p>
+            <a:pPr lvl="1"/>
             <a:r>
               <a:rPr lang="en-US" dirty="0"/>
-              <a:t>Once you reference the </a:t>
-            </a:r>
-            <a:r>
-              <a:rPr lang="en-US" dirty="0" err="1"/>
-              <a:t>LicenseCode</a:t>
-            </a:r>
+              <a:t>Protection – Check that the caller has access permissions required to perform the request</a:t>
+            </a:r>
+          </a:p>
+          <a:p>
+            <a:pPr lvl="1"/>
             <a:r>
               <a:rPr lang="en-US" dirty="0"/>
-              <a:t> proxy, </a:t>
-            </a:r>
-            <a:r>
-              <a:rPr lang="en-US" dirty="0" err="1"/>
-              <a:t>nhibernate</a:t>
-            </a:r>
+              <a:t>Smart – Adds to or change the request before sending them (NHibernate)</a:t>
+            </a:r>
+          </a:p>
+          <a:p>
             <a:r>
               <a:rPr lang="en-US" dirty="0"/>
-              <a:t> will fetch the row from the database and create the </a:t>
-            </a:r>
-            <a:r>
-              <a:rPr lang="en-US" dirty="0" err="1"/>
-              <a:t>LicenseCode</a:t>
-            </a:r>
-            <a:endParaRPr lang="en-US" dirty="0"/>
-          </a:p>
-          <a:p>
-            <a:r>
-              <a:rPr lang="en-US" dirty="0" err="1"/>
-              <a:t>Nhibernate</a:t>
-            </a:r>
+              <a:t>The Subject defines the common interface for Real Subject and Proxy so Proxy can be used anywhere Real Subject is expected</a:t>
+            </a:r>
+          </a:p>
+          <a:p>
             <a:r>
               <a:rPr lang="en-US" dirty="0"/>
-              <a:t> uses Castle Proxies as do our </a:t>
-            </a:r>
-            <a:r>
-              <a:rPr lang="en-US" dirty="0" err="1"/>
-              <a:t>ApiFactory</a:t>
-            </a:r>
-            <a:endParaRPr lang="en-US" dirty="0"/>
-          </a:p>
-          <a:p>
-            <a:pPr marL="0" indent="0">
-              <a:buNone/>
-            </a:pPr>
+              <a:t>The Real Subject defines the ‘real’ object that the proxy represents</a:t>
+            </a:r>
+          </a:p>
+          <a:p>
             <a:endParaRPr lang="en-US" dirty="0"/>
           </a:p>
         </p:txBody>
@@ -6530,7 +6439,7 @@
     </p:spTree>
     <p:extLst>
       <p:ext uri="{BB962C8B-B14F-4D97-AF65-F5344CB8AC3E}">
-        <p14:creationId xmlns:p14="http://schemas.microsoft.com/office/powerpoint/2010/main" val="2274898210"/>
+        <p14:creationId xmlns:p14="http://schemas.microsoft.com/office/powerpoint/2010/main" val="2107916926"/>
       </p:ext>
     </p:extLst>
   </p:cSld>
@@ -6562,6 +6471,170 @@
           <p:cNvPr id="2" name="Title 1">
             <a:extLst>
               <a:ext uri="{FF2B5EF4-FFF2-40B4-BE49-F238E27FC236}">
+                <a16:creationId xmlns:a16="http://schemas.microsoft.com/office/drawing/2014/main" id="{14A5DE64-64B7-4121-8DBF-9988BAD28A4B}"/>
+              </a:ext>
+            </a:extLst>
+          </p:cNvPr>
+          <p:cNvSpPr>
+            <a:spLocks noGrp="1"/>
+          </p:cNvSpPr>
+          <p:nvPr>
+            <p:ph type="title"/>
+          </p:nvPr>
+        </p:nvSpPr>
+        <p:spPr/>
+        <p:txBody>
+          <a:bodyPr/>
+          <a:lstStyle/>
+          <a:p>
+            <a:r>
+              <a:rPr lang="en-US" dirty="0" err="1"/>
+              <a:t>Nhibernate</a:t>
+            </a:r>
+            <a:r>
+              <a:rPr lang="en-US" dirty="0"/>
+              <a:t>	</a:t>
+            </a:r>
+          </a:p>
+        </p:txBody>
+      </p:sp>
+      <p:sp>
+        <p:nvSpPr>
+          <p:cNvPr id="3" name="Content Placeholder 2">
+            <a:extLst>
+              <a:ext uri="{FF2B5EF4-FFF2-40B4-BE49-F238E27FC236}">
+                <a16:creationId xmlns:a16="http://schemas.microsoft.com/office/drawing/2014/main" id="{67A21B1F-1FBF-4FA4-8E5B-3AEF56DDAEA3}"/>
+              </a:ext>
+            </a:extLst>
+          </p:cNvPr>
+          <p:cNvSpPr>
+            <a:spLocks noGrp="1"/>
+          </p:cNvSpPr>
+          <p:nvPr>
+            <p:ph idx="1"/>
+          </p:nvPr>
+        </p:nvSpPr>
+        <p:spPr/>
+        <p:txBody>
+          <a:bodyPr/>
+          <a:lstStyle/>
+          <a:p>
+            <a:r>
+              <a:rPr lang="en-US" dirty="0" err="1"/>
+              <a:t>Nhibernate</a:t>
+            </a:r>
+            <a:r>
+              <a:rPr lang="en-US" dirty="0"/>
+              <a:t> is the biggest example of where we run into proxies. You may not see it, but under the hood, </a:t>
+            </a:r>
+            <a:r>
+              <a:rPr lang="en-US" dirty="0" err="1"/>
+              <a:t>nhibernate</a:t>
+            </a:r>
+            <a:r>
+              <a:rPr lang="en-US" dirty="0"/>
+              <a:t> is substituting proxies for our Business Models, which is why they have to have ‘virtual’ keywords</a:t>
+            </a:r>
+          </a:p>
+          <a:p>
+            <a:r>
+              <a:rPr lang="en-US" dirty="0"/>
+              <a:t>When </a:t>
+            </a:r>
+            <a:r>
+              <a:rPr lang="en-US" dirty="0" err="1"/>
+              <a:t>Nhibernate</a:t>
+            </a:r>
+            <a:r>
+              <a:rPr lang="en-US" dirty="0"/>
+              <a:t> first grabs an entity with lazy loaded parents (think license and it’s license code) it doesn’t immediately fetch the license code. </a:t>
+            </a:r>
+          </a:p>
+          <a:p>
+            <a:r>
+              <a:rPr lang="en-US" dirty="0"/>
+              <a:t>Once you reference the </a:t>
+            </a:r>
+            <a:r>
+              <a:rPr lang="en-US" dirty="0" err="1"/>
+              <a:t>LicenseCode</a:t>
+            </a:r>
+            <a:r>
+              <a:rPr lang="en-US" dirty="0"/>
+              <a:t> proxy, </a:t>
+            </a:r>
+            <a:r>
+              <a:rPr lang="en-US" dirty="0" err="1"/>
+              <a:t>nhibernate</a:t>
+            </a:r>
+            <a:r>
+              <a:rPr lang="en-US" dirty="0"/>
+              <a:t> will fetch the row from the database and create the </a:t>
+            </a:r>
+            <a:r>
+              <a:rPr lang="en-US" dirty="0" err="1"/>
+              <a:t>LicenseCode</a:t>
+            </a:r>
+            <a:endParaRPr lang="en-US" dirty="0"/>
+          </a:p>
+          <a:p>
+            <a:r>
+              <a:rPr lang="en-US" dirty="0" err="1"/>
+              <a:t>Nhibernate</a:t>
+            </a:r>
+            <a:r>
+              <a:rPr lang="en-US" dirty="0"/>
+              <a:t> uses Castle Proxies as do our </a:t>
+            </a:r>
+            <a:r>
+              <a:rPr lang="en-US" dirty="0" err="1"/>
+              <a:t>ApiFactory</a:t>
+            </a:r>
+            <a:endParaRPr lang="en-US" dirty="0"/>
+          </a:p>
+          <a:p>
+            <a:pPr marL="0" indent="0">
+              <a:buNone/>
+            </a:pPr>
+            <a:endParaRPr lang="en-US" dirty="0"/>
+          </a:p>
+        </p:txBody>
+      </p:sp>
+    </p:spTree>
+    <p:extLst>
+      <p:ext uri="{BB962C8B-B14F-4D97-AF65-F5344CB8AC3E}">
+        <p14:creationId xmlns:p14="http://schemas.microsoft.com/office/powerpoint/2010/main" val="2274898210"/>
+      </p:ext>
+    </p:extLst>
+  </p:cSld>
+  <p:clrMapOvr>
+    <a:masterClrMapping/>
+  </p:clrMapOvr>
+</p:sld>
+</file>
+
+<file path=ppt/slides/slide5.xml><?xml version="1.0" encoding="utf-8"?>
+<p:sld xmlns:a="http://schemas.openxmlformats.org/drawingml/2006/main" xmlns:r="http://schemas.openxmlformats.org/officeDocument/2006/relationships" xmlns:p="http://schemas.openxmlformats.org/presentationml/2006/main">
+  <p:cSld>
+    <p:spTree>
+      <p:nvGrpSpPr>
+        <p:cNvPr id="1" name=""/>
+        <p:cNvGrpSpPr/>
+        <p:nvPr/>
+      </p:nvGrpSpPr>
+      <p:grpSpPr>
+        <a:xfrm>
+          <a:off x="0" y="0"/>
+          <a:ext cx="0" cy="0"/>
+          <a:chOff x="0" y="0"/>
+          <a:chExt cx="0" cy="0"/>
+        </a:xfrm>
+      </p:grpSpPr>
+      <p:sp>
+        <p:nvSpPr>
+          <p:cNvPr id="2" name="Title 1">
+            <a:extLst>
+              <a:ext uri="{FF2B5EF4-FFF2-40B4-BE49-F238E27FC236}">
                 <a16:creationId xmlns:a16="http://schemas.microsoft.com/office/drawing/2014/main" id="{9BE0CF32-3D10-4B53-AF0C-90E51CCEB8DF}"/>
               </a:ext>
             </a:extLst>
@@ -6661,7 +6734,7 @@
 </p:sld>
 </file>
 
-<file path=ppt/slides/slide5.xml><?xml version="1.0" encoding="utf-8"?>
+<file path=ppt/slides/slide6.xml><?xml version="1.0" encoding="utf-8"?>
 <p:sld xmlns:a="http://schemas.openxmlformats.org/drawingml/2006/main" xmlns:r="http://schemas.openxmlformats.org/officeDocument/2006/relationships" xmlns:p="http://schemas.openxmlformats.org/presentationml/2006/main">
   <p:cSld>
     <p:spTree>

</xml_diff>